<commit_message>
Add template to ppt
</commit_message>
<xml_diff>
--- a/Session06-v1.pptx
+++ b/Session06-v1.pptx
@@ -12268,7 +12268,7 @@
         </p:blipFill>
         <p:spPr>
           <a:xfrm>
-            <a:off x="8332816" y="531321"/>
+            <a:off x="8332816" y="883011"/>
             <a:ext cx="2829273" cy="1468501"/>
           </a:xfrm>
           <a:prstGeom prst="rect">
@@ -12298,7 +12298,7 @@
         </p:blipFill>
         <p:spPr>
           <a:xfrm>
-            <a:off x="7707086" y="2191108"/>
+            <a:off x="7707086" y="2542798"/>
             <a:ext cx="4080734" cy="748537"/>
           </a:xfrm>
           <a:prstGeom prst="rect">

</xml_diff>